<commit_message>
Added Troubleshooting guide to WiFi Dongles and Networks in BuildingImage_RaspberryPi.docx
</commit_message>
<xml_diff>
--- a/Presentations/CW Debug over Simulator.pptx
+++ b/Presentations/CW Debug over Simulator.pptx
@@ -12,20 +12,22 @@
     <p:sldId id="280" r:id="rId6"/>
     <p:sldId id="281" r:id="rId7"/>
     <p:sldId id="282" r:id="rId8"/>
-    <p:sldId id="283" r:id="rId9"/>
-    <p:sldId id="285" r:id="rId10"/>
-    <p:sldId id="284" r:id="rId11"/>
-    <p:sldId id="286" r:id="rId12"/>
-    <p:sldId id="287" r:id="rId13"/>
-    <p:sldId id="288" r:id="rId14"/>
-    <p:sldId id="289" r:id="rId15"/>
-    <p:sldId id="290" r:id="rId16"/>
-    <p:sldId id="291" r:id="rId17"/>
-    <p:sldId id="293" r:id="rId18"/>
-    <p:sldId id="297" r:id="rId19"/>
-    <p:sldId id="295" r:id="rId20"/>
-    <p:sldId id="294" r:id="rId21"/>
-    <p:sldId id="296" r:id="rId22"/>
+    <p:sldId id="298" r:id="rId9"/>
+    <p:sldId id="299" r:id="rId10"/>
+    <p:sldId id="283" r:id="rId11"/>
+    <p:sldId id="285" r:id="rId12"/>
+    <p:sldId id="284" r:id="rId13"/>
+    <p:sldId id="286" r:id="rId14"/>
+    <p:sldId id="287" r:id="rId15"/>
+    <p:sldId id="288" r:id="rId16"/>
+    <p:sldId id="289" r:id="rId17"/>
+    <p:sldId id="290" r:id="rId18"/>
+    <p:sldId id="291" r:id="rId19"/>
+    <p:sldId id="293" r:id="rId20"/>
+    <p:sldId id="297" r:id="rId21"/>
+    <p:sldId id="295" r:id="rId22"/>
+    <p:sldId id="294" r:id="rId23"/>
+    <p:sldId id="296" r:id="rId24"/>
   </p:sldIdLst>
   <p:sldSz cx="12192000" cy="6858000"/>
   <p:notesSz cx="6858000" cy="9144000"/>
@@ -130,6 +132,10 @@
     </p:ext>
   </p:extLst>
 </p:presentation>
+</file>
+
+<file path=ppt/revisionInfo.xml><?xml version="1.0" encoding="utf-8"?>
+<p1510:revInfo xmlns:a="http://schemas.openxmlformats.org/drawingml/2006/main" xmlns:r="http://schemas.openxmlformats.org/officeDocument/2006/relationships" xmlns:p1510="http://schemas.microsoft.com/office/powerpoint/2015/10/main"/>
 </file>
 
 <file path=ppt/slideLayouts/slideLayout1.xml><?xml version="1.0" encoding="utf-8"?>
@@ -855,7 +861,7 @@
             <a:fld id="{B61BEF0D-F0BB-DE4B-95CE-6DB70DBA9567}" type="datetimeFigureOut">
               <a:rPr lang="en-US" dirty="0"/>
               <a:pPr/>
-              <a:t>8/14/2017</a:t>
+              <a:t>3/30/2018</a:t>
             </a:fld>
             <a:endParaRPr lang="en-US" dirty="0"/>
           </a:p>
@@ -1103,7 +1109,7 @@
             <a:fld id="{B61BEF0D-F0BB-DE4B-95CE-6DB70DBA9567}" type="datetimeFigureOut">
               <a:rPr lang="en-US" dirty="0"/>
               <a:pPr/>
-              <a:t>8/14/2017</a:t>
+              <a:t>3/30/2018</a:t>
             </a:fld>
             <a:endParaRPr lang="en-US" dirty="0"/>
           </a:p>
@@ -1414,7 +1420,7 @@
             <a:fld id="{B61BEF0D-F0BB-DE4B-95CE-6DB70DBA9567}" type="datetimeFigureOut">
               <a:rPr lang="en-US" dirty="0"/>
               <a:pPr/>
-              <a:t>8/14/2017</a:t>
+              <a:t>3/30/2018</a:t>
             </a:fld>
             <a:endParaRPr lang="en-US" dirty="0"/>
           </a:p>
@@ -1752,7 +1758,7 @@
             <a:fld id="{B61BEF0D-F0BB-DE4B-95CE-6DB70DBA9567}" type="datetimeFigureOut">
               <a:rPr lang="en-US" dirty="0"/>
               <a:pPr/>
-              <a:t>8/14/2017</a:t>
+              <a:t>3/30/2018</a:t>
             </a:fld>
             <a:endParaRPr lang="en-US" dirty="0"/>
           </a:p>
@@ -2063,7 +2069,7 @@
             <a:fld id="{B61BEF0D-F0BB-DE4B-95CE-6DB70DBA9567}" type="datetimeFigureOut">
               <a:rPr lang="en-US" dirty="0"/>
               <a:pPr/>
-              <a:t>8/14/2017</a:t>
+              <a:t>3/30/2018</a:t>
             </a:fld>
             <a:endParaRPr lang="en-US" dirty="0"/>
           </a:p>
@@ -2453,7 +2459,7 @@
             <a:fld id="{B61BEF0D-F0BB-DE4B-95CE-6DB70DBA9567}" type="datetimeFigureOut">
               <a:rPr lang="en-US" dirty="0"/>
               <a:pPr/>
-              <a:t>8/14/2017</a:t>
+              <a:t>3/30/2018</a:t>
             </a:fld>
             <a:endParaRPr lang="en-US" dirty="0"/>
           </a:p>
@@ -2619,7 +2625,7 @@
           <a:p>
             <a:fld id="{55C6B4A9-1611-4792-9094-5F34BCA07E0B}" type="datetimeFigureOut">
               <a:rPr lang="en-US" dirty="0"/>
-              <a:t>8/14/2017</a:t>
+              <a:t>3/30/2018</a:t>
             </a:fld>
             <a:endParaRPr lang="en-US" dirty="0"/>
           </a:p>
@@ -2795,7 +2801,7 @@
             <a:fld id="{B61BEF0D-F0BB-DE4B-95CE-6DB70DBA9567}" type="datetimeFigureOut">
               <a:rPr lang="en-US" dirty="0"/>
               <a:pPr/>
-              <a:t>8/14/2017</a:t>
+              <a:t>3/30/2018</a:t>
             </a:fld>
             <a:endParaRPr lang="en-US" dirty="0"/>
           </a:p>
@@ -2968,7 +2974,7 @@
             <a:fld id="{B61BEF0D-F0BB-DE4B-95CE-6DB70DBA9567}" type="datetimeFigureOut">
               <a:rPr lang="en-US" dirty="0"/>
               <a:pPr/>
-              <a:t>8/14/2017</a:t>
+              <a:t>3/30/2018</a:t>
             </a:fld>
             <a:endParaRPr lang="en-US" dirty="0"/>
           </a:p>
@@ -3212,7 +3218,7 @@
             <a:fld id="{B61BEF0D-F0BB-DE4B-95CE-6DB70DBA9567}" type="datetimeFigureOut">
               <a:rPr lang="en-US" dirty="0"/>
               <a:pPr/>
-              <a:t>8/14/2017</a:t>
+              <a:t>3/30/2018</a:t>
             </a:fld>
             <a:endParaRPr lang="en-US" dirty="0"/>
           </a:p>
@@ -3440,7 +3446,7 @@
           <a:p>
             <a:fld id="{EB712588-04B1-427B-82EE-E8DB90309F08}" type="datetimeFigureOut">
               <a:rPr lang="en-US" dirty="0"/>
-              <a:t>8/14/2017</a:t>
+              <a:t>3/30/2018</a:t>
             </a:fld>
             <a:endParaRPr lang="en-US" dirty="0"/>
           </a:p>
@@ -3810,7 +3816,7 @@
             <a:fld id="{B61BEF0D-F0BB-DE4B-95CE-6DB70DBA9567}" type="datetimeFigureOut">
               <a:rPr lang="en-US" dirty="0"/>
               <a:pPr/>
-              <a:t>8/14/2017</a:t>
+              <a:t>3/30/2018</a:t>
             </a:fld>
             <a:endParaRPr lang="en-US" dirty="0"/>
           </a:p>
@@ -3930,7 +3936,7 @@
             <a:fld id="{B61BEF0D-F0BB-DE4B-95CE-6DB70DBA9567}" type="datetimeFigureOut">
               <a:rPr lang="en-US" dirty="0"/>
               <a:pPr/>
-              <a:t>8/14/2017</a:t>
+              <a:t>3/30/2018</a:t>
             </a:fld>
             <a:endParaRPr lang="en-US" dirty="0"/>
           </a:p>
@@ -4022,7 +4028,7 @@
             <a:fld id="{B61BEF0D-F0BB-DE4B-95CE-6DB70DBA9567}" type="datetimeFigureOut">
               <a:rPr lang="en-US" dirty="0"/>
               <a:pPr/>
-              <a:t>8/14/2017</a:t>
+              <a:t>3/30/2018</a:t>
             </a:fld>
             <a:endParaRPr lang="en-US" dirty="0"/>
           </a:p>
@@ -4273,7 +4279,7 @@
           <a:p>
             <a:fld id="{42A54C80-263E-416B-A8E0-580EDEADCBDC}" type="datetimeFigureOut">
               <a:rPr lang="en-US" dirty="0"/>
-              <a:t>8/14/2017</a:t>
+              <a:t>3/30/2018</a:t>
             </a:fld>
             <a:endParaRPr lang="en-US" dirty="0"/>
           </a:p>
@@ -4532,7 +4538,7 @@
             <a:fld id="{B61BEF0D-F0BB-DE4B-95CE-6DB70DBA9567}" type="datetimeFigureOut">
               <a:rPr lang="en-US" dirty="0"/>
               <a:pPr/>
-              <a:t>8/14/2017</a:t>
+              <a:t>3/30/2018</a:t>
             </a:fld>
             <a:endParaRPr lang="en-US" dirty="0"/>
           </a:p>
@@ -5272,7 +5278,7 @@
             <a:fld id="{B61BEF0D-F0BB-DE4B-95CE-6DB70DBA9567}" type="datetimeFigureOut">
               <a:rPr lang="en-US" dirty="0"/>
               <a:pPr/>
-              <a:t>8/14/2017</a:t>
+              <a:t>3/30/2018</a:t>
             </a:fld>
             <a:endParaRPr lang="en-US" dirty="0"/>
           </a:p>
@@ -5815,7 +5821,7 @@
             <a:pPr algn="ctr"/>
             <a:r>
               <a:rPr lang="en-US" dirty="0"/>
-              <a:t>CW Debugging over Simulator</a:t>
+              <a:t>CW Debugging over Simulator / CFP</a:t>
             </a:r>
           </a:p>
         </p:txBody>
@@ -5908,6 +5914,202 @@
           <a:p>
             <a:r>
               <a:rPr lang="en-US" b="1" dirty="0"/>
+              <a:t>Adding Source Paths					p3</a:t>
+            </a:r>
+          </a:p>
+        </p:txBody>
+      </p:sp>
+      <p:sp>
+        <p:nvSpPr>
+          <p:cNvPr id="10" name="Rectangle 9"/>
+          <p:cNvSpPr/>
+          <p:nvPr/>
+        </p:nvSpPr>
+        <p:spPr>
+          <a:xfrm>
+            <a:off x="5524500" y="1053584"/>
+            <a:ext cx="6096000" cy="646331"/>
+          </a:xfrm>
+          <a:prstGeom prst="rect">
+            <a:avLst/>
+          </a:prstGeom>
+        </p:spPr>
+        <p:txBody>
+          <a:bodyPr>
+            <a:spAutoFit/>
+          </a:bodyPr>
+          <a:lstStyle/>
+          <a:p>
+            <a:endParaRPr lang="en-US" dirty="0"/>
+          </a:p>
+          <a:p>
+            <a:endParaRPr lang="en-US" dirty="0"/>
+          </a:p>
+        </p:txBody>
+      </p:sp>
+      <p:pic>
+        <p:nvPicPr>
+          <p:cNvPr id="3" name="Picture 2"/>
+          <p:cNvPicPr>
+            <a:picLocks noChangeAspect="1"/>
+          </p:cNvPicPr>
+          <p:nvPr/>
+        </p:nvPicPr>
+        <p:blipFill>
+          <a:blip r:embed="rId2"/>
+          <a:stretch>
+            <a:fillRect/>
+          </a:stretch>
+        </p:blipFill>
+        <p:spPr>
+          <a:xfrm>
+            <a:off x="1369951" y="1191237"/>
+            <a:ext cx="8309097" cy="5406657"/>
+          </a:xfrm>
+          <a:prstGeom prst="rect">
+            <a:avLst/>
+          </a:prstGeom>
+        </p:spPr>
+      </p:pic>
+    </p:spTree>
+    <p:extLst>
+      <p:ext uri="{BB962C8B-B14F-4D97-AF65-F5344CB8AC3E}">
+        <p14:creationId xmlns:p14="http://schemas.microsoft.com/office/powerpoint/2010/main" val="628995793"/>
+      </p:ext>
+    </p:extLst>
+  </p:cSld>
+  <p:clrMapOvr>
+    <a:masterClrMapping/>
+  </p:clrMapOvr>
+</p:sld>
+</file>
+
+<file path=ppt/slides/slide11.xml><?xml version="1.0" encoding="utf-8"?>
+<p:sld xmlns:a="http://schemas.openxmlformats.org/drawingml/2006/main" xmlns:r="http://schemas.openxmlformats.org/officeDocument/2006/relationships" xmlns:p="http://schemas.openxmlformats.org/presentationml/2006/main">
+  <p:cSld>
+    <p:spTree>
+      <p:nvGrpSpPr>
+        <p:cNvPr id="1" name=""/>
+        <p:cNvGrpSpPr/>
+        <p:nvPr/>
+      </p:nvGrpSpPr>
+      <p:grpSpPr>
+        <a:xfrm>
+          <a:off x="0" y="0"/>
+          <a:ext cx="0" cy="0"/>
+          <a:chOff x="0" y="0"/>
+          <a:chExt cx="0" cy="0"/>
+        </a:xfrm>
+      </p:grpSpPr>
+      <p:sp>
+        <p:nvSpPr>
+          <p:cNvPr id="4" name="Rectangle 3"/>
+          <p:cNvSpPr/>
+          <p:nvPr/>
+        </p:nvSpPr>
+        <p:spPr>
+          <a:xfrm>
+            <a:off x="265286" y="316496"/>
+            <a:ext cx="9010599" cy="369332"/>
+          </a:xfrm>
+          <a:prstGeom prst="rect">
+            <a:avLst/>
+          </a:prstGeom>
+        </p:spPr>
+        <p:txBody>
+          <a:bodyPr wrap="square">
+            <a:spAutoFit/>
+          </a:bodyPr>
+          <a:lstStyle/>
+          <a:p>
+            <a:r>
+              <a:rPr lang="en-US" b="1" dirty="0"/>
+              <a:t>Adding Source Paths					p4</a:t>
+            </a:r>
+          </a:p>
+        </p:txBody>
+      </p:sp>
+      <p:sp>
+        <p:nvSpPr>
+          <p:cNvPr id="10" name="Rectangle 9"/>
+          <p:cNvSpPr/>
+          <p:nvPr/>
+        </p:nvSpPr>
+        <p:spPr>
+          <a:xfrm>
+            <a:off x="5524500" y="1053584"/>
+            <a:ext cx="6096000" cy="646331"/>
+          </a:xfrm>
+          <a:prstGeom prst="rect">
+            <a:avLst/>
+          </a:prstGeom>
+        </p:spPr>
+        <p:txBody>
+          <a:bodyPr>
+            <a:spAutoFit/>
+          </a:bodyPr>
+          <a:lstStyle/>
+          <a:p>
+            <a:endParaRPr lang="en-US" dirty="0"/>
+          </a:p>
+          <a:p>
+            <a:endParaRPr lang="en-US" dirty="0"/>
+          </a:p>
+        </p:txBody>
+      </p:sp>
+    </p:spTree>
+    <p:extLst>
+      <p:ext uri="{BB962C8B-B14F-4D97-AF65-F5344CB8AC3E}">
+        <p14:creationId xmlns:p14="http://schemas.microsoft.com/office/powerpoint/2010/main" val="1216055662"/>
+      </p:ext>
+    </p:extLst>
+  </p:cSld>
+  <p:clrMapOvr>
+    <a:masterClrMapping/>
+  </p:clrMapOvr>
+</p:sld>
+</file>
+
+<file path=ppt/slides/slide12.xml><?xml version="1.0" encoding="utf-8"?>
+<p:sld xmlns:a="http://schemas.openxmlformats.org/drawingml/2006/main" xmlns:r="http://schemas.openxmlformats.org/officeDocument/2006/relationships" xmlns:p="http://schemas.openxmlformats.org/presentationml/2006/main">
+  <p:cSld>
+    <p:spTree>
+      <p:nvGrpSpPr>
+        <p:cNvPr id="1" name=""/>
+        <p:cNvGrpSpPr/>
+        <p:nvPr/>
+      </p:nvGrpSpPr>
+      <p:grpSpPr>
+        <a:xfrm>
+          <a:off x="0" y="0"/>
+          <a:ext cx="0" cy="0"/>
+          <a:chOff x="0" y="0"/>
+          <a:chExt cx="0" cy="0"/>
+        </a:xfrm>
+      </p:grpSpPr>
+      <p:sp>
+        <p:nvSpPr>
+          <p:cNvPr id="4" name="Rectangle 3"/>
+          <p:cNvSpPr/>
+          <p:nvPr/>
+        </p:nvSpPr>
+        <p:spPr>
+          <a:xfrm>
+            <a:off x="265286" y="316496"/>
+            <a:ext cx="9010599" cy="369332"/>
+          </a:xfrm>
+          <a:prstGeom prst="rect">
+            <a:avLst/>
+          </a:prstGeom>
+        </p:spPr>
+        <p:txBody>
+          <a:bodyPr wrap="square">
+            <a:spAutoFit/>
+          </a:bodyPr>
+          <a:lstStyle/>
+          <a:p>
+            <a:r>
+              <a:rPr lang="en-US" b="1" dirty="0"/>
               <a:t>Importing Symbols					pg1</a:t>
             </a:r>
           </a:p>
@@ -6002,7 +6204,7 @@
 </p:sld>
 </file>
 
-<file path=ppt/slides/slide11.xml><?xml version="1.0" encoding="utf-8"?>
+<file path=ppt/slides/slide13.xml><?xml version="1.0" encoding="utf-8"?>
 <p:sld xmlns:a="http://schemas.openxmlformats.org/drawingml/2006/main" xmlns:r="http://schemas.openxmlformats.org/officeDocument/2006/relationships" xmlns:p="http://schemas.openxmlformats.org/presentationml/2006/main">
   <p:cSld>
     <p:spTree>
@@ -6192,219 +6394,6 @@
 </p:sld>
 </file>
 
-<file path=ppt/slides/slide12.xml><?xml version="1.0" encoding="utf-8"?>
-<p:sld xmlns:a="http://schemas.openxmlformats.org/drawingml/2006/main" xmlns:r="http://schemas.openxmlformats.org/officeDocument/2006/relationships" xmlns:p="http://schemas.openxmlformats.org/presentationml/2006/main">
-  <p:cSld>
-    <p:spTree>
-      <p:nvGrpSpPr>
-        <p:cNvPr id="1" name=""/>
-        <p:cNvGrpSpPr/>
-        <p:nvPr/>
-      </p:nvGrpSpPr>
-      <p:grpSpPr>
-        <a:xfrm>
-          <a:off x="0" y="0"/>
-          <a:ext cx="0" cy="0"/>
-          <a:chOff x="0" y="0"/>
-          <a:chExt cx="0" cy="0"/>
-        </a:xfrm>
-      </p:grpSpPr>
-      <p:sp>
-        <p:nvSpPr>
-          <p:cNvPr id="5" name="Rectangle 4"/>
-          <p:cNvSpPr/>
-          <p:nvPr/>
-        </p:nvSpPr>
-        <p:spPr>
-          <a:xfrm>
-            <a:off x="265286" y="316496"/>
-            <a:ext cx="9010599" cy="369332"/>
-          </a:xfrm>
-          <a:prstGeom prst="rect">
-            <a:avLst/>
-          </a:prstGeom>
-        </p:spPr>
-        <p:txBody>
-          <a:bodyPr wrap="square">
-            <a:spAutoFit/>
-          </a:bodyPr>
-          <a:lstStyle/>
-          <a:p>
-            <a:r>
-              <a:rPr lang="en-US" b="1" dirty="0"/>
-              <a:t>Importing Symbols					pg3</a:t>
-            </a:r>
-          </a:p>
-        </p:txBody>
-      </p:sp>
-      <p:pic>
-        <p:nvPicPr>
-          <p:cNvPr id="2" name="Picture 1"/>
-          <p:cNvPicPr>
-            <a:picLocks noChangeAspect="1"/>
-          </p:cNvPicPr>
-          <p:nvPr/>
-        </p:nvPicPr>
-        <p:blipFill>
-          <a:blip r:embed="rId2"/>
-          <a:stretch>
-            <a:fillRect/>
-          </a:stretch>
-        </p:blipFill>
-        <p:spPr>
-          <a:xfrm>
-            <a:off x="1285142" y="1127614"/>
-            <a:ext cx="6667500" cy="5200650"/>
-          </a:xfrm>
-          <a:prstGeom prst="rect">
-            <a:avLst/>
-          </a:prstGeom>
-        </p:spPr>
-      </p:pic>
-    </p:spTree>
-    <p:extLst>
-      <p:ext uri="{BB962C8B-B14F-4D97-AF65-F5344CB8AC3E}">
-        <p14:creationId xmlns:p14="http://schemas.microsoft.com/office/powerpoint/2010/main" val="2904273086"/>
-      </p:ext>
-    </p:extLst>
-  </p:cSld>
-  <p:clrMapOvr>
-    <a:masterClrMapping/>
-  </p:clrMapOvr>
-</p:sld>
-</file>
-
-<file path=ppt/slides/slide13.xml><?xml version="1.0" encoding="utf-8"?>
-<p:sld xmlns:a="http://schemas.openxmlformats.org/drawingml/2006/main" xmlns:r="http://schemas.openxmlformats.org/officeDocument/2006/relationships" xmlns:p="http://schemas.openxmlformats.org/presentationml/2006/main">
-  <p:cSld>
-    <p:spTree>
-      <p:nvGrpSpPr>
-        <p:cNvPr id="1" name=""/>
-        <p:cNvGrpSpPr/>
-        <p:nvPr/>
-      </p:nvGrpSpPr>
-      <p:grpSpPr>
-        <a:xfrm>
-          <a:off x="0" y="0"/>
-          <a:ext cx="0" cy="0"/>
-          <a:chOff x="0" y="0"/>
-          <a:chExt cx="0" cy="0"/>
-        </a:xfrm>
-      </p:grpSpPr>
-      <p:sp>
-        <p:nvSpPr>
-          <p:cNvPr id="5" name="Rectangle 4"/>
-          <p:cNvSpPr/>
-          <p:nvPr/>
-        </p:nvSpPr>
-        <p:spPr>
-          <a:xfrm>
-            <a:off x="265286" y="316496"/>
-            <a:ext cx="9010599" cy="369332"/>
-          </a:xfrm>
-          <a:prstGeom prst="rect">
-            <a:avLst/>
-          </a:prstGeom>
-        </p:spPr>
-        <p:txBody>
-          <a:bodyPr wrap="square">
-            <a:spAutoFit/>
-          </a:bodyPr>
-          <a:lstStyle/>
-          <a:p>
-            <a:r>
-              <a:rPr lang="en-US" b="1" dirty="0"/>
-              <a:t>Environment Setting	(</a:t>
-            </a:r>
-            <a:r>
-              <a:rPr lang="en-US" b="1" dirty="0" err="1"/>
-              <a:t>uBoot</a:t>
-            </a:r>
-            <a:r>
-              <a:rPr lang="en-US" b="1" dirty="0"/>
-              <a:t> / linux)			pg1				</a:t>
-            </a:r>
-          </a:p>
-        </p:txBody>
-      </p:sp>
-      <p:pic>
-        <p:nvPicPr>
-          <p:cNvPr id="3" name="Picture 2"/>
-          <p:cNvPicPr>
-            <a:picLocks noChangeAspect="1"/>
-          </p:cNvPicPr>
-          <p:nvPr/>
-        </p:nvPicPr>
-        <p:blipFill>
-          <a:blip r:embed="rId2"/>
-          <a:stretch>
-            <a:fillRect/>
-          </a:stretch>
-        </p:blipFill>
-        <p:spPr>
-          <a:xfrm>
-            <a:off x="1866122" y="1253118"/>
-            <a:ext cx="9033363" cy="5268209"/>
-          </a:xfrm>
-          <a:prstGeom prst="rect">
-            <a:avLst/>
-          </a:prstGeom>
-        </p:spPr>
-      </p:pic>
-      <p:sp>
-        <p:nvSpPr>
-          <p:cNvPr id="6" name="Rectangle: Rounded Corners 5"/>
-          <p:cNvSpPr/>
-          <p:nvPr/>
-        </p:nvSpPr>
-        <p:spPr>
-          <a:xfrm>
-            <a:off x="2196950" y="3479637"/>
-            <a:ext cx="1190062" cy="373905"/>
-          </a:xfrm>
-          <a:prstGeom prst="roundRect">
-            <a:avLst/>
-          </a:prstGeom>
-          <a:noFill/>
-        </p:spPr>
-        <p:style>
-          <a:lnRef idx="2">
-            <a:schemeClr val="accent1">
-              <a:shade val="50000"/>
-            </a:schemeClr>
-          </a:lnRef>
-          <a:fillRef idx="1">
-            <a:schemeClr val="accent1"/>
-          </a:fillRef>
-          <a:effectRef idx="0">
-            <a:schemeClr val="accent1"/>
-          </a:effectRef>
-          <a:fontRef idx="minor">
-            <a:schemeClr val="lt1"/>
-          </a:fontRef>
-        </p:style>
-        <p:txBody>
-          <a:bodyPr rtlCol="0" anchor="ctr"/>
-          <a:lstStyle/>
-          <a:p>
-            <a:pPr algn="ctr"/>
-            <a:endParaRPr lang="en-US" dirty="0"/>
-          </a:p>
-        </p:txBody>
-      </p:sp>
-    </p:spTree>
-    <p:extLst>
-      <p:ext uri="{BB962C8B-B14F-4D97-AF65-F5344CB8AC3E}">
-        <p14:creationId xmlns:p14="http://schemas.microsoft.com/office/powerpoint/2010/main" val="4095895799"/>
-      </p:ext>
-    </p:extLst>
-  </p:cSld>
-  <p:clrMapOvr>
-    <a:masterClrMapping/>
-  </p:clrMapOvr>
-</p:sld>
-</file>
-
 <file path=ppt/slides/slide14.xml><?xml version="1.0" encoding="utf-8"?>
 <p:sld xmlns:a="http://schemas.openxmlformats.org/drawingml/2006/main" xmlns:r="http://schemas.openxmlformats.org/officeDocument/2006/relationships" xmlns:p="http://schemas.openxmlformats.org/presentationml/2006/main">
   <p:cSld>
@@ -6445,15 +6434,7 @@
           <a:p>
             <a:r>
               <a:rPr lang="en-US" b="1" dirty="0"/>
-              <a:t>Environment Setting	(</a:t>
-            </a:r>
-            <a:r>
-              <a:rPr lang="en-US" b="1" dirty="0" err="1"/>
-              <a:t>uBoot</a:t>
-            </a:r>
-            <a:r>
-              <a:rPr lang="en-US" b="1" dirty="0"/>
-              <a:t> / linux)			pg2			</a:t>
+              <a:t>Importing Symbols					pg3</a:t>
             </a:r>
           </a:p>
         </p:txBody>
@@ -6474,183 +6455,18 @@
         </p:blipFill>
         <p:spPr>
           <a:xfrm>
-            <a:off x="159778" y="912597"/>
-            <a:ext cx="5772516" cy="3180588"/>
+            <a:off x="1285142" y="1127614"/>
+            <a:ext cx="6667500" cy="5200650"/>
           </a:xfrm>
           <a:prstGeom prst="rect">
             <a:avLst/>
           </a:prstGeom>
         </p:spPr>
       </p:pic>
-      <p:pic>
-        <p:nvPicPr>
-          <p:cNvPr id="4" name="Picture 3"/>
-          <p:cNvPicPr>
-            <a:picLocks noChangeAspect="1"/>
-          </p:cNvPicPr>
-          <p:nvPr/>
-        </p:nvPicPr>
-        <p:blipFill>
-          <a:blip r:embed="rId3"/>
-          <a:stretch>
-            <a:fillRect/>
-          </a:stretch>
-        </p:blipFill>
-        <p:spPr>
-          <a:xfrm>
-            <a:off x="6037802" y="3401103"/>
-            <a:ext cx="6097099" cy="3379231"/>
-          </a:xfrm>
-          <a:prstGeom prst="rect">
-            <a:avLst/>
-          </a:prstGeom>
-        </p:spPr>
-      </p:pic>
-      <p:sp>
-        <p:nvSpPr>
-          <p:cNvPr id="6" name="TextBox 5"/>
-          <p:cNvSpPr txBox="1"/>
-          <p:nvPr/>
-        </p:nvSpPr>
-        <p:spPr>
-          <a:xfrm>
-            <a:off x="2656345" y="4135288"/>
-            <a:ext cx="779381" cy="369332"/>
-          </a:xfrm>
-          <a:prstGeom prst="rect">
-            <a:avLst/>
-          </a:prstGeom>
-          <a:noFill/>
-        </p:spPr>
-        <p:txBody>
-          <a:bodyPr wrap="none" rtlCol="0">
-            <a:spAutoFit/>
-          </a:bodyPr>
-          <a:lstStyle/>
-          <a:p>
-            <a:r>
-              <a:rPr lang="en-US" dirty="0" err="1"/>
-              <a:t>uBoot</a:t>
-            </a:r>
-            <a:endParaRPr lang="en-US" dirty="0"/>
-          </a:p>
-        </p:txBody>
-      </p:sp>
-      <p:sp>
-        <p:nvSpPr>
-          <p:cNvPr id="7" name="TextBox 6"/>
-          <p:cNvSpPr txBox="1"/>
-          <p:nvPr/>
-        </p:nvSpPr>
-        <p:spPr>
-          <a:xfrm>
-            <a:off x="9086351" y="3031771"/>
-            <a:ext cx="686406" cy="369332"/>
-          </a:xfrm>
-          <a:prstGeom prst="rect">
-            <a:avLst/>
-          </a:prstGeom>
-          <a:noFill/>
-        </p:spPr>
-        <p:txBody>
-          <a:bodyPr wrap="none" rtlCol="0">
-            <a:spAutoFit/>
-          </a:bodyPr>
-          <a:lstStyle/>
-          <a:p>
-            <a:r>
-              <a:rPr lang="en-US" dirty="0"/>
-              <a:t>linux</a:t>
-            </a:r>
-          </a:p>
-        </p:txBody>
-      </p:sp>
-      <p:sp>
-        <p:nvSpPr>
-          <p:cNvPr id="8" name="Rectangle: Rounded Corners 7"/>
-          <p:cNvSpPr/>
-          <p:nvPr/>
-        </p:nvSpPr>
-        <p:spPr>
-          <a:xfrm>
-            <a:off x="2001007" y="2975785"/>
-            <a:ext cx="1367344" cy="209938"/>
-          </a:xfrm>
-          <a:prstGeom prst="roundRect">
-            <a:avLst/>
-          </a:prstGeom>
-          <a:noFill/>
-        </p:spPr>
-        <p:style>
-          <a:lnRef idx="2">
-            <a:schemeClr val="accent1">
-              <a:shade val="50000"/>
-            </a:schemeClr>
-          </a:lnRef>
-          <a:fillRef idx="1">
-            <a:schemeClr val="accent1"/>
-          </a:fillRef>
-          <a:effectRef idx="0">
-            <a:schemeClr val="accent1"/>
-          </a:effectRef>
-          <a:fontRef idx="minor">
-            <a:schemeClr val="lt1"/>
-          </a:fontRef>
-        </p:style>
-        <p:txBody>
-          <a:bodyPr rtlCol="0" anchor="ctr"/>
-          <a:lstStyle/>
-          <a:p>
-            <a:pPr algn="ctr"/>
-            <a:endParaRPr lang="en-US" dirty="0"/>
-          </a:p>
-        </p:txBody>
-      </p:sp>
-      <p:sp>
-        <p:nvSpPr>
-          <p:cNvPr id="9" name="Rectangle: Rounded Corners 8"/>
-          <p:cNvSpPr/>
-          <p:nvPr/>
-        </p:nvSpPr>
-        <p:spPr>
-          <a:xfrm>
-            <a:off x="8001851" y="5595422"/>
-            <a:ext cx="1367344" cy="209938"/>
-          </a:xfrm>
-          <a:prstGeom prst="roundRect">
-            <a:avLst/>
-          </a:prstGeom>
-          <a:noFill/>
-        </p:spPr>
-        <p:style>
-          <a:lnRef idx="2">
-            <a:schemeClr val="accent1">
-              <a:shade val="50000"/>
-            </a:schemeClr>
-          </a:lnRef>
-          <a:fillRef idx="1">
-            <a:schemeClr val="accent1"/>
-          </a:fillRef>
-          <a:effectRef idx="0">
-            <a:schemeClr val="accent1"/>
-          </a:effectRef>
-          <a:fontRef idx="minor">
-            <a:schemeClr val="lt1"/>
-          </a:fontRef>
-        </p:style>
-        <p:txBody>
-          <a:bodyPr rtlCol="0" anchor="ctr"/>
-          <a:lstStyle/>
-          <a:p>
-            <a:pPr algn="ctr"/>
-            <a:endParaRPr lang="en-US" dirty="0"/>
-          </a:p>
-        </p:txBody>
-      </p:sp>
     </p:spTree>
     <p:extLst>
       <p:ext uri="{BB962C8B-B14F-4D97-AF65-F5344CB8AC3E}">
-        <p14:creationId xmlns:p14="http://schemas.microsoft.com/office/powerpoint/2010/main" val="510626248"/>
+        <p14:creationId xmlns:p14="http://schemas.microsoft.com/office/powerpoint/2010/main" val="2904273086"/>
       </p:ext>
     </p:extLst>
   </p:cSld>
@@ -6708,14 +6524,14 @@
             </a:r>
             <a:r>
               <a:rPr lang="en-US" b="1" dirty="0"/>
-              <a:t> / linux)			pg3			</a:t>
+              <a:t> / linux)			pg1				</a:t>
             </a:r>
           </a:p>
         </p:txBody>
       </p:sp>
       <p:pic>
         <p:nvPicPr>
-          <p:cNvPr id="2" name="Picture 1"/>
+          <p:cNvPr id="3" name="Picture 2"/>
           <p:cNvPicPr>
             <a:picLocks noChangeAspect="1"/>
           </p:cNvPicPr>
@@ -6729,107 +6545,24 @@
         </p:blipFill>
         <p:spPr>
           <a:xfrm>
-            <a:off x="265286" y="854244"/>
-            <a:ext cx="6475900" cy="3609098"/>
+            <a:off x="1866122" y="1253118"/>
+            <a:ext cx="9033363" cy="5268209"/>
           </a:xfrm>
           <a:prstGeom prst="rect">
             <a:avLst/>
           </a:prstGeom>
         </p:spPr>
       </p:pic>
-      <p:pic>
-        <p:nvPicPr>
-          <p:cNvPr id="3" name="Picture 2"/>
-          <p:cNvPicPr>
-            <a:picLocks noChangeAspect="1"/>
-          </p:cNvPicPr>
-          <p:nvPr/>
-        </p:nvPicPr>
-        <p:blipFill>
-          <a:blip r:embed="rId3"/>
-          <a:stretch>
-            <a:fillRect/>
-          </a:stretch>
-        </p:blipFill>
-        <p:spPr>
-          <a:xfrm>
-            <a:off x="6242538" y="3527093"/>
-            <a:ext cx="5878024" cy="3229428"/>
-          </a:xfrm>
-          <a:prstGeom prst="rect">
-            <a:avLst/>
-          </a:prstGeom>
-        </p:spPr>
-      </p:pic>
-      <p:sp>
-        <p:nvSpPr>
-          <p:cNvPr id="6" name="TextBox 5"/>
-          <p:cNvSpPr txBox="1"/>
-          <p:nvPr/>
-        </p:nvSpPr>
-        <p:spPr>
-          <a:xfrm>
-            <a:off x="2634330" y="4447092"/>
-            <a:ext cx="779381" cy="369332"/>
-          </a:xfrm>
-          <a:prstGeom prst="rect">
-            <a:avLst/>
-          </a:prstGeom>
-          <a:noFill/>
-        </p:spPr>
-        <p:txBody>
-          <a:bodyPr wrap="none" rtlCol="0">
-            <a:spAutoFit/>
-          </a:bodyPr>
-          <a:lstStyle/>
-          <a:p>
-            <a:r>
-              <a:rPr lang="en-US" dirty="0" err="1"/>
-              <a:t>uBoot</a:t>
-            </a:r>
-            <a:endParaRPr lang="en-US" dirty="0"/>
-          </a:p>
-        </p:txBody>
-      </p:sp>
-      <p:sp>
-        <p:nvSpPr>
-          <p:cNvPr id="7" name="TextBox 6"/>
-          <p:cNvSpPr txBox="1"/>
-          <p:nvPr/>
-        </p:nvSpPr>
-        <p:spPr>
-          <a:xfrm>
-            <a:off x="8932682" y="3157761"/>
-            <a:ext cx="686406" cy="369332"/>
-          </a:xfrm>
-          <a:prstGeom prst="rect">
-            <a:avLst/>
-          </a:prstGeom>
-          <a:noFill/>
-        </p:spPr>
-        <p:txBody>
-          <a:bodyPr wrap="none" rtlCol="0">
-            <a:spAutoFit/>
-          </a:bodyPr>
-          <a:lstStyle/>
-          <a:p>
-            <a:r>
-              <a:rPr lang="en-US" dirty="0"/>
-              <a:t>linux</a:t>
-            </a:r>
-          </a:p>
-        </p:txBody>
-      </p:sp>
-      <p:sp>
-        <p:nvSpPr>
-          <p:cNvPr id="8" name="Rectangle: Rounded Corners 7"/>
+      <p:sp>
+        <p:nvSpPr>
+          <p:cNvPr id="6" name="Rectangle: Rounded Corners 5"/>
           <p:cNvSpPr/>
           <p:nvPr/>
         </p:nvSpPr>
         <p:spPr>
           <a:xfrm>
-            <a:off x="2313210" y="3407351"/>
-            <a:ext cx="3657600" cy="295470"/>
+            <a:off x="2196950" y="3479637"/>
+            <a:ext cx="1190062" cy="373905"/>
           </a:xfrm>
           <a:prstGeom prst="roundRect">
             <a:avLst/>
@@ -6861,133 +6594,10 @@
           </a:p>
         </p:txBody>
       </p:sp>
-      <p:sp>
-        <p:nvSpPr>
-          <p:cNvPr id="9" name="Rectangle: Rounded Corners 8"/>
-          <p:cNvSpPr/>
-          <p:nvPr/>
-        </p:nvSpPr>
-        <p:spPr>
-          <a:xfrm>
-            <a:off x="8064759" y="5832629"/>
-            <a:ext cx="3657600" cy="295470"/>
-          </a:xfrm>
-          <a:prstGeom prst="roundRect">
-            <a:avLst/>
-          </a:prstGeom>
-          <a:noFill/>
-        </p:spPr>
-        <p:style>
-          <a:lnRef idx="2">
-            <a:schemeClr val="accent1">
-              <a:shade val="50000"/>
-            </a:schemeClr>
-          </a:lnRef>
-          <a:fillRef idx="1">
-            <a:schemeClr val="accent1"/>
-          </a:fillRef>
-          <a:effectRef idx="0">
-            <a:schemeClr val="accent1"/>
-          </a:effectRef>
-          <a:fontRef idx="minor">
-            <a:schemeClr val="lt1"/>
-          </a:fontRef>
-        </p:style>
-        <p:txBody>
-          <a:bodyPr rtlCol="0" anchor="ctr"/>
-          <a:lstStyle/>
-          <a:p>
-            <a:pPr algn="ctr"/>
-            <a:endParaRPr lang="en-US" dirty="0"/>
-          </a:p>
-        </p:txBody>
-      </p:sp>
-      <p:sp>
-        <p:nvSpPr>
-          <p:cNvPr id="10" name="Rectangle: Rounded Corners 9"/>
-          <p:cNvSpPr/>
-          <p:nvPr/>
-        </p:nvSpPr>
-        <p:spPr>
-          <a:xfrm>
-            <a:off x="2313210" y="1819470"/>
-            <a:ext cx="1745606" cy="419877"/>
-          </a:xfrm>
-          <a:prstGeom prst="roundRect">
-            <a:avLst/>
-          </a:prstGeom>
-          <a:noFill/>
-        </p:spPr>
-        <p:style>
-          <a:lnRef idx="2">
-            <a:schemeClr val="accent1">
-              <a:shade val="50000"/>
-            </a:schemeClr>
-          </a:lnRef>
-          <a:fillRef idx="1">
-            <a:schemeClr val="accent1"/>
-          </a:fillRef>
-          <a:effectRef idx="0">
-            <a:schemeClr val="accent1"/>
-          </a:effectRef>
-          <a:fontRef idx="minor">
-            <a:schemeClr val="lt1"/>
-          </a:fontRef>
-        </p:style>
-        <p:txBody>
-          <a:bodyPr rtlCol="0" anchor="ctr"/>
-          <a:lstStyle/>
-          <a:p>
-            <a:pPr algn="ctr"/>
-            <a:endParaRPr lang="en-US" dirty="0"/>
-          </a:p>
-        </p:txBody>
-      </p:sp>
-      <p:sp>
-        <p:nvSpPr>
-          <p:cNvPr id="11" name="Rectangle: Rounded Corners 10"/>
-          <p:cNvSpPr/>
-          <p:nvPr/>
-        </p:nvSpPr>
-        <p:spPr>
-          <a:xfrm>
-            <a:off x="8101261" y="4396547"/>
-            <a:ext cx="1468751" cy="419877"/>
-          </a:xfrm>
-          <a:prstGeom prst="roundRect">
-            <a:avLst/>
-          </a:prstGeom>
-          <a:noFill/>
-        </p:spPr>
-        <p:style>
-          <a:lnRef idx="2">
-            <a:schemeClr val="accent1">
-              <a:shade val="50000"/>
-            </a:schemeClr>
-          </a:lnRef>
-          <a:fillRef idx="1">
-            <a:schemeClr val="accent1"/>
-          </a:fillRef>
-          <a:effectRef idx="0">
-            <a:schemeClr val="accent1"/>
-          </a:effectRef>
-          <a:fontRef idx="minor">
-            <a:schemeClr val="lt1"/>
-          </a:fontRef>
-        </p:style>
-        <p:txBody>
-          <a:bodyPr rtlCol="0" anchor="ctr"/>
-          <a:lstStyle/>
-          <a:p>
-            <a:pPr algn="ctr"/>
-            <a:endParaRPr lang="en-US" dirty="0"/>
-          </a:p>
-        </p:txBody>
-      </p:sp>
     </p:spTree>
     <p:extLst>
       <p:ext uri="{BB962C8B-B14F-4D97-AF65-F5344CB8AC3E}">
-        <p14:creationId xmlns:p14="http://schemas.microsoft.com/office/powerpoint/2010/main" val="2665403146"/>
+        <p14:creationId xmlns:p14="http://schemas.microsoft.com/office/powerpoint/2010/main" val="4095895799"/>
       </p:ext>
     </p:extLst>
   </p:cSld>
@@ -7045,7 +6655,7 @@
             </a:r>
             <a:r>
               <a:rPr lang="en-US" b="1" dirty="0"/>
-              <a:t> / linux)			pg4			</a:t>
+              <a:t> / linux)			pg2			</a:t>
             </a:r>
           </a:p>
         </p:txBody>
@@ -7066,8 +6676,8 @@
         </p:blipFill>
         <p:spPr>
           <a:xfrm>
-            <a:off x="265286" y="900113"/>
-            <a:ext cx="6012422" cy="3324907"/>
+            <a:off x="159778" y="912597"/>
+            <a:ext cx="5772516" cy="3180588"/>
           </a:xfrm>
           <a:prstGeom prst="rect">
             <a:avLst/>
@@ -7076,7 +6686,7 @@
       </p:pic>
       <p:pic>
         <p:nvPicPr>
-          <p:cNvPr id="3" name="Picture 2"/>
+          <p:cNvPr id="4" name="Picture 3"/>
           <p:cNvPicPr>
             <a:picLocks noChangeAspect="1"/>
           </p:cNvPicPr>
@@ -7090,8 +6700,8 @@
         </p:blipFill>
         <p:spPr>
           <a:xfrm>
-            <a:off x="6453553" y="3610802"/>
-            <a:ext cx="5649423" cy="3135095"/>
+            <a:off x="6037802" y="3401103"/>
+            <a:ext cx="6097099" cy="3379231"/>
           </a:xfrm>
           <a:prstGeom prst="rect">
             <a:avLst/>
@@ -7100,14 +6710,73 @@
       </p:pic>
       <p:sp>
         <p:nvSpPr>
-          <p:cNvPr id="4" name="Rectangle: Rounded Corners 3"/>
+          <p:cNvPr id="6" name="TextBox 5"/>
+          <p:cNvSpPr txBox="1"/>
+          <p:nvPr/>
+        </p:nvSpPr>
+        <p:spPr>
+          <a:xfrm>
+            <a:off x="2656345" y="4135288"/>
+            <a:ext cx="779381" cy="369332"/>
+          </a:xfrm>
+          <a:prstGeom prst="rect">
+            <a:avLst/>
+          </a:prstGeom>
+          <a:noFill/>
+        </p:spPr>
+        <p:txBody>
+          <a:bodyPr wrap="none" rtlCol="0">
+            <a:spAutoFit/>
+          </a:bodyPr>
+          <a:lstStyle/>
+          <a:p>
+            <a:r>
+              <a:rPr lang="en-US" dirty="0" err="1"/>
+              <a:t>uBoot</a:t>
+            </a:r>
+            <a:endParaRPr lang="en-US" dirty="0"/>
+          </a:p>
+        </p:txBody>
+      </p:sp>
+      <p:sp>
+        <p:nvSpPr>
+          <p:cNvPr id="7" name="TextBox 6"/>
+          <p:cNvSpPr txBox="1"/>
+          <p:nvPr/>
+        </p:nvSpPr>
+        <p:spPr>
+          <a:xfrm>
+            <a:off x="9086351" y="3031771"/>
+            <a:ext cx="686406" cy="369332"/>
+          </a:xfrm>
+          <a:prstGeom prst="rect">
+            <a:avLst/>
+          </a:prstGeom>
+          <a:noFill/>
+        </p:spPr>
+        <p:txBody>
+          <a:bodyPr wrap="none" rtlCol="0">
+            <a:spAutoFit/>
+          </a:bodyPr>
+          <a:lstStyle/>
+          <a:p>
+            <a:r>
+              <a:rPr lang="en-US" dirty="0"/>
+              <a:t>linux</a:t>
+            </a:r>
+          </a:p>
+        </p:txBody>
+      </p:sp>
+      <p:sp>
+        <p:nvSpPr>
+          <p:cNvPr id="8" name="Rectangle: Rounded Corners 7"/>
           <p:cNvSpPr/>
           <p:nvPr/>
         </p:nvSpPr>
         <p:spPr>
           <a:xfrm>
-            <a:off x="2164702" y="1903445"/>
-            <a:ext cx="886408" cy="419877"/>
+            <a:off x="2001007" y="2975785"/>
+            <a:ext cx="1367344" cy="209938"/>
           </a:xfrm>
           <a:prstGeom prst="roundRect">
             <a:avLst/>
@@ -7141,14 +6810,14 @@
       </p:sp>
       <p:sp>
         <p:nvSpPr>
-          <p:cNvPr id="6" name="Rectangle: Rounded Corners 5"/>
+          <p:cNvPr id="9" name="Rectangle: Rounded Corners 8"/>
           <p:cNvSpPr/>
           <p:nvPr/>
         </p:nvSpPr>
         <p:spPr>
           <a:xfrm>
-            <a:off x="8214049" y="4565780"/>
-            <a:ext cx="886408" cy="419877"/>
+            <a:off x="8001851" y="5595422"/>
+            <a:ext cx="1367344" cy="209938"/>
           </a:xfrm>
           <a:prstGeom prst="roundRect">
             <a:avLst/>
@@ -7180,151 +6849,10 @@
           </a:p>
         </p:txBody>
       </p:sp>
-      <p:sp>
-        <p:nvSpPr>
-          <p:cNvPr id="7" name="Rectangle: Rounded Corners 6"/>
-          <p:cNvSpPr/>
-          <p:nvPr/>
-        </p:nvSpPr>
-        <p:spPr>
-          <a:xfrm>
-            <a:off x="8214048" y="5840963"/>
-            <a:ext cx="2301551" cy="234752"/>
-          </a:xfrm>
-          <a:prstGeom prst="roundRect">
-            <a:avLst/>
-          </a:prstGeom>
-          <a:noFill/>
-        </p:spPr>
-        <p:style>
-          <a:lnRef idx="2">
-            <a:schemeClr val="accent1">
-              <a:shade val="50000"/>
-            </a:schemeClr>
-          </a:lnRef>
-          <a:fillRef idx="1">
-            <a:schemeClr val="accent1"/>
-          </a:fillRef>
-          <a:effectRef idx="0">
-            <a:schemeClr val="accent1"/>
-          </a:effectRef>
-          <a:fontRef idx="minor">
-            <a:schemeClr val="lt1"/>
-          </a:fontRef>
-        </p:style>
-        <p:txBody>
-          <a:bodyPr rtlCol="0" anchor="ctr"/>
-          <a:lstStyle/>
-          <a:p>
-            <a:pPr algn="ctr"/>
-            <a:endParaRPr lang="en-US" dirty="0"/>
-          </a:p>
-        </p:txBody>
-      </p:sp>
-      <p:sp>
-        <p:nvSpPr>
-          <p:cNvPr id="8" name="Rectangle: Rounded Corners 7"/>
-          <p:cNvSpPr/>
-          <p:nvPr/>
-        </p:nvSpPr>
-        <p:spPr>
-          <a:xfrm>
-            <a:off x="2164702" y="2746310"/>
-            <a:ext cx="3657600" cy="295470"/>
-          </a:xfrm>
-          <a:prstGeom prst="roundRect">
-            <a:avLst/>
-          </a:prstGeom>
-          <a:noFill/>
-        </p:spPr>
-        <p:style>
-          <a:lnRef idx="2">
-            <a:schemeClr val="accent1">
-              <a:shade val="50000"/>
-            </a:schemeClr>
-          </a:lnRef>
-          <a:fillRef idx="1">
-            <a:schemeClr val="accent1"/>
-          </a:fillRef>
-          <a:effectRef idx="0">
-            <a:schemeClr val="accent1"/>
-          </a:effectRef>
-          <a:fontRef idx="minor">
-            <a:schemeClr val="lt1"/>
-          </a:fontRef>
-        </p:style>
-        <p:txBody>
-          <a:bodyPr rtlCol="0" anchor="ctr"/>
-          <a:lstStyle/>
-          <a:p>
-            <a:pPr algn="ctr"/>
-            <a:endParaRPr lang="en-US" dirty="0"/>
-          </a:p>
-        </p:txBody>
-      </p:sp>
-      <p:sp>
-        <p:nvSpPr>
-          <p:cNvPr id="9" name="TextBox 8"/>
-          <p:cNvSpPr txBox="1"/>
-          <p:nvPr/>
-        </p:nvSpPr>
-        <p:spPr>
-          <a:xfrm>
-            <a:off x="2671653" y="4278676"/>
-            <a:ext cx="779381" cy="369332"/>
-          </a:xfrm>
-          <a:prstGeom prst="rect">
-            <a:avLst/>
-          </a:prstGeom>
-          <a:noFill/>
-        </p:spPr>
-        <p:txBody>
-          <a:bodyPr wrap="none" rtlCol="0">
-            <a:spAutoFit/>
-          </a:bodyPr>
-          <a:lstStyle/>
-          <a:p>
-            <a:r>
-              <a:rPr lang="en-US" dirty="0" err="1"/>
-              <a:t>uBoot</a:t>
-            </a:r>
-            <a:endParaRPr lang="en-US" dirty="0"/>
-          </a:p>
-        </p:txBody>
-      </p:sp>
-      <p:sp>
-        <p:nvSpPr>
-          <p:cNvPr id="10" name="TextBox 9"/>
-          <p:cNvSpPr txBox="1"/>
-          <p:nvPr/>
-        </p:nvSpPr>
-        <p:spPr>
-          <a:xfrm>
-            <a:off x="9021620" y="3266034"/>
-            <a:ext cx="686406" cy="369332"/>
-          </a:xfrm>
-          <a:prstGeom prst="rect">
-            <a:avLst/>
-          </a:prstGeom>
-          <a:noFill/>
-        </p:spPr>
-        <p:txBody>
-          <a:bodyPr wrap="none" rtlCol="0">
-            <a:spAutoFit/>
-          </a:bodyPr>
-          <a:lstStyle/>
-          <a:p>
-            <a:r>
-              <a:rPr lang="en-US" dirty="0"/>
-              <a:t>linux</a:t>
-            </a:r>
-          </a:p>
-        </p:txBody>
-      </p:sp>
     </p:spTree>
     <p:extLst>
       <p:ext uri="{BB962C8B-B14F-4D97-AF65-F5344CB8AC3E}">
-        <p14:creationId xmlns:p14="http://schemas.microsoft.com/office/powerpoint/2010/main" val="4230121359"/>
+        <p14:creationId xmlns:p14="http://schemas.microsoft.com/office/powerpoint/2010/main" val="510626248"/>
       </p:ext>
     </p:extLst>
   </p:cSld>
@@ -7359,8 +6887,8 @@
         </p:nvSpPr>
         <p:spPr>
           <a:xfrm>
-            <a:off x="4238319" y="2725588"/>
-            <a:ext cx="5072736" cy="1015663"/>
+            <a:off x="265286" y="316496"/>
+            <a:ext cx="9010599" cy="369332"/>
           </a:xfrm>
           <a:prstGeom prst="rect">
             <a:avLst/>
@@ -7373,16 +6901,295 @@
           <a:lstStyle/>
           <a:p>
             <a:r>
-              <a:rPr lang="en-US" sz="6000" b="1" dirty="0"/>
-              <a:t>Q n A</a:t>
-            </a:r>
+              <a:rPr lang="en-US" b="1" dirty="0"/>
+              <a:t>Environment Setting	(</a:t>
+            </a:r>
+            <a:r>
+              <a:rPr lang="en-US" b="1" dirty="0" err="1"/>
+              <a:t>uBoot</a:t>
+            </a:r>
+            <a:r>
+              <a:rPr lang="en-US" b="1" dirty="0"/>
+              <a:t> / linux)			pg3			</a:t>
+            </a:r>
+          </a:p>
+        </p:txBody>
+      </p:sp>
+      <p:pic>
+        <p:nvPicPr>
+          <p:cNvPr id="2" name="Picture 1"/>
+          <p:cNvPicPr>
+            <a:picLocks noChangeAspect="1"/>
+          </p:cNvPicPr>
+          <p:nvPr/>
+        </p:nvPicPr>
+        <p:blipFill>
+          <a:blip r:embed="rId2"/>
+          <a:stretch>
+            <a:fillRect/>
+          </a:stretch>
+        </p:blipFill>
+        <p:spPr>
+          <a:xfrm>
+            <a:off x="265286" y="854244"/>
+            <a:ext cx="6475900" cy="3609098"/>
+          </a:xfrm>
+          <a:prstGeom prst="rect">
+            <a:avLst/>
+          </a:prstGeom>
+        </p:spPr>
+      </p:pic>
+      <p:pic>
+        <p:nvPicPr>
+          <p:cNvPr id="3" name="Picture 2"/>
+          <p:cNvPicPr>
+            <a:picLocks noChangeAspect="1"/>
+          </p:cNvPicPr>
+          <p:nvPr/>
+        </p:nvPicPr>
+        <p:blipFill>
+          <a:blip r:embed="rId3"/>
+          <a:stretch>
+            <a:fillRect/>
+          </a:stretch>
+        </p:blipFill>
+        <p:spPr>
+          <a:xfrm>
+            <a:off x="6242538" y="3527093"/>
+            <a:ext cx="5878024" cy="3229428"/>
+          </a:xfrm>
+          <a:prstGeom prst="rect">
+            <a:avLst/>
+          </a:prstGeom>
+        </p:spPr>
+      </p:pic>
+      <p:sp>
+        <p:nvSpPr>
+          <p:cNvPr id="6" name="TextBox 5"/>
+          <p:cNvSpPr txBox="1"/>
+          <p:nvPr/>
+        </p:nvSpPr>
+        <p:spPr>
+          <a:xfrm>
+            <a:off x="2634330" y="4447092"/>
+            <a:ext cx="779381" cy="369332"/>
+          </a:xfrm>
+          <a:prstGeom prst="rect">
+            <a:avLst/>
+          </a:prstGeom>
+          <a:noFill/>
+        </p:spPr>
+        <p:txBody>
+          <a:bodyPr wrap="none" rtlCol="0">
+            <a:spAutoFit/>
+          </a:bodyPr>
+          <a:lstStyle/>
+          <a:p>
+            <a:r>
+              <a:rPr lang="en-US" dirty="0" err="1"/>
+              <a:t>uBoot</a:t>
+            </a:r>
+            <a:endParaRPr lang="en-US" dirty="0"/>
+          </a:p>
+        </p:txBody>
+      </p:sp>
+      <p:sp>
+        <p:nvSpPr>
+          <p:cNvPr id="7" name="TextBox 6"/>
+          <p:cNvSpPr txBox="1"/>
+          <p:nvPr/>
+        </p:nvSpPr>
+        <p:spPr>
+          <a:xfrm>
+            <a:off x="8932682" y="3157761"/>
+            <a:ext cx="686406" cy="369332"/>
+          </a:xfrm>
+          <a:prstGeom prst="rect">
+            <a:avLst/>
+          </a:prstGeom>
+          <a:noFill/>
+        </p:spPr>
+        <p:txBody>
+          <a:bodyPr wrap="none" rtlCol="0">
+            <a:spAutoFit/>
+          </a:bodyPr>
+          <a:lstStyle/>
+          <a:p>
+            <a:r>
+              <a:rPr lang="en-US" dirty="0"/>
+              <a:t>linux</a:t>
+            </a:r>
+          </a:p>
+        </p:txBody>
+      </p:sp>
+      <p:sp>
+        <p:nvSpPr>
+          <p:cNvPr id="8" name="Rectangle: Rounded Corners 7"/>
+          <p:cNvSpPr/>
+          <p:nvPr/>
+        </p:nvSpPr>
+        <p:spPr>
+          <a:xfrm>
+            <a:off x="2313210" y="3407351"/>
+            <a:ext cx="3657600" cy="295470"/>
+          </a:xfrm>
+          <a:prstGeom prst="roundRect">
+            <a:avLst/>
+          </a:prstGeom>
+          <a:noFill/>
+        </p:spPr>
+        <p:style>
+          <a:lnRef idx="2">
+            <a:schemeClr val="accent1">
+              <a:shade val="50000"/>
+            </a:schemeClr>
+          </a:lnRef>
+          <a:fillRef idx="1">
+            <a:schemeClr val="accent1"/>
+          </a:fillRef>
+          <a:effectRef idx="0">
+            <a:schemeClr val="accent1"/>
+          </a:effectRef>
+          <a:fontRef idx="minor">
+            <a:schemeClr val="lt1"/>
+          </a:fontRef>
+        </p:style>
+        <p:txBody>
+          <a:bodyPr rtlCol="0" anchor="ctr"/>
+          <a:lstStyle/>
+          <a:p>
+            <a:pPr algn="ctr"/>
+            <a:endParaRPr lang="en-US" dirty="0"/>
+          </a:p>
+        </p:txBody>
+      </p:sp>
+      <p:sp>
+        <p:nvSpPr>
+          <p:cNvPr id="9" name="Rectangle: Rounded Corners 8"/>
+          <p:cNvSpPr/>
+          <p:nvPr/>
+        </p:nvSpPr>
+        <p:spPr>
+          <a:xfrm>
+            <a:off x="8064759" y="5832629"/>
+            <a:ext cx="3657600" cy="295470"/>
+          </a:xfrm>
+          <a:prstGeom prst="roundRect">
+            <a:avLst/>
+          </a:prstGeom>
+          <a:noFill/>
+        </p:spPr>
+        <p:style>
+          <a:lnRef idx="2">
+            <a:schemeClr val="accent1">
+              <a:shade val="50000"/>
+            </a:schemeClr>
+          </a:lnRef>
+          <a:fillRef idx="1">
+            <a:schemeClr val="accent1"/>
+          </a:fillRef>
+          <a:effectRef idx="0">
+            <a:schemeClr val="accent1"/>
+          </a:effectRef>
+          <a:fontRef idx="minor">
+            <a:schemeClr val="lt1"/>
+          </a:fontRef>
+        </p:style>
+        <p:txBody>
+          <a:bodyPr rtlCol="0" anchor="ctr"/>
+          <a:lstStyle/>
+          <a:p>
+            <a:pPr algn="ctr"/>
+            <a:endParaRPr lang="en-US" dirty="0"/>
+          </a:p>
+        </p:txBody>
+      </p:sp>
+      <p:sp>
+        <p:nvSpPr>
+          <p:cNvPr id="10" name="Rectangle: Rounded Corners 9"/>
+          <p:cNvSpPr/>
+          <p:nvPr/>
+        </p:nvSpPr>
+        <p:spPr>
+          <a:xfrm>
+            <a:off x="2313210" y="1819470"/>
+            <a:ext cx="1745606" cy="419877"/>
+          </a:xfrm>
+          <a:prstGeom prst="roundRect">
+            <a:avLst/>
+          </a:prstGeom>
+          <a:noFill/>
+        </p:spPr>
+        <p:style>
+          <a:lnRef idx="2">
+            <a:schemeClr val="accent1">
+              <a:shade val="50000"/>
+            </a:schemeClr>
+          </a:lnRef>
+          <a:fillRef idx="1">
+            <a:schemeClr val="accent1"/>
+          </a:fillRef>
+          <a:effectRef idx="0">
+            <a:schemeClr val="accent1"/>
+          </a:effectRef>
+          <a:fontRef idx="minor">
+            <a:schemeClr val="lt1"/>
+          </a:fontRef>
+        </p:style>
+        <p:txBody>
+          <a:bodyPr rtlCol="0" anchor="ctr"/>
+          <a:lstStyle/>
+          <a:p>
+            <a:pPr algn="ctr"/>
+            <a:endParaRPr lang="en-US" dirty="0"/>
+          </a:p>
+        </p:txBody>
+      </p:sp>
+      <p:sp>
+        <p:nvSpPr>
+          <p:cNvPr id="11" name="Rectangle: Rounded Corners 10"/>
+          <p:cNvSpPr/>
+          <p:nvPr/>
+        </p:nvSpPr>
+        <p:spPr>
+          <a:xfrm>
+            <a:off x="8101261" y="4396547"/>
+            <a:ext cx="1468751" cy="419877"/>
+          </a:xfrm>
+          <a:prstGeom prst="roundRect">
+            <a:avLst/>
+          </a:prstGeom>
+          <a:noFill/>
+        </p:spPr>
+        <p:style>
+          <a:lnRef idx="2">
+            <a:schemeClr val="accent1">
+              <a:shade val="50000"/>
+            </a:schemeClr>
+          </a:lnRef>
+          <a:fillRef idx="1">
+            <a:schemeClr val="accent1"/>
+          </a:fillRef>
+          <a:effectRef idx="0">
+            <a:schemeClr val="accent1"/>
+          </a:effectRef>
+          <a:fontRef idx="minor">
+            <a:schemeClr val="lt1"/>
+          </a:fontRef>
+        </p:style>
+        <p:txBody>
+          <a:bodyPr rtlCol="0" anchor="ctr"/>
+          <a:lstStyle/>
+          <a:p>
+            <a:pPr algn="ctr"/>
+            <a:endParaRPr lang="en-US" dirty="0"/>
           </a:p>
         </p:txBody>
       </p:sp>
     </p:spTree>
     <p:extLst>
       <p:ext uri="{BB962C8B-B14F-4D97-AF65-F5344CB8AC3E}">
-        <p14:creationId xmlns:p14="http://schemas.microsoft.com/office/powerpoint/2010/main" val="2147064688"/>
+        <p14:creationId xmlns:p14="http://schemas.microsoft.com/office/powerpoint/2010/main" val="2665403146"/>
       </p:ext>
     </p:extLst>
   </p:cSld>
@@ -7417,8 +7224,8 @@
         </p:nvSpPr>
         <p:spPr>
           <a:xfrm>
-            <a:off x="4238319" y="2725588"/>
-            <a:ext cx="5072736" cy="1015663"/>
+            <a:off x="265286" y="316496"/>
+            <a:ext cx="9010599" cy="369332"/>
           </a:xfrm>
           <a:prstGeom prst="rect">
             <a:avLst/>
@@ -7431,8 +7238,287 @@
           <a:lstStyle/>
           <a:p>
             <a:r>
-              <a:rPr lang="en-US" sz="6000" b="1" dirty="0"/>
-              <a:t>Backup Slides</a:t>
+              <a:rPr lang="en-US" b="1" dirty="0"/>
+              <a:t>Environment Setting	(</a:t>
+            </a:r>
+            <a:r>
+              <a:rPr lang="en-US" b="1" dirty="0" err="1"/>
+              <a:t>uBoot</a:t>
+            </a:r>
+            <a:r>
+              <a:rPr lang="en-US" b="1" dirty="0"/>
+              <a:t> / linux)			pg4			</a:t>
+            </a:r>
+          </a:p>
+        </p:txBody>
+      </p:sp>
+      <p:pic>
+        <p:nvPicPr>
+          <p:cNvPr id="2" name="Picture 1"/>
+          <p:cNvPicPr>
+            <a:picLocks noChangeAspect="1"/>
+          </p:cNvPicPr>
+          <p:nvPr/>
+        </p:nvPicPr>
+        <p:blipFill>
+          <a:blip r:embed="rId2"/>
+          <a:stretch>
+            <a:fillRect/>
+          </a:stretch>
+        </p:blipFill>
+        <p:spPr>
+          <a:xfrm>
+            <a:off x="265286" y="900113"/>
+            <a:ext cx="6012422" cy="3324907"/>
+          </a:xfrm>
+          <a:prstGeom prst="rect">
+            <a:avLst/>
+          </a:prstGeom>
+        </p:spPr>
+      </p:pic>
+      <p:pic>
+        <p:nvPicPr>
+          <p:cNvPr id="3" name="Picture 2"/>
+          <p:cNvPicPr>
+            <a:picLocks noChangeAspect="1"/>
+          </p:cNvPicPr>
+          <p:nvPr/>
+        </p:nvPicPr>
+        <p:blipFill>
+          <a:blip r:embed="rId3"/>
+          <a:stretch>
+            <a:fillRect/>
+          </a:stretch>
+        </p:blipFill>
+        <p:spPr>
+          <a:xfrm>
+            <a:off x="6453553" y="3610802"/>
+            <a:ext cx="5649423" cy="3135095"/>
+          </a:xfrm>
+          <a:prstGeom prst="rect">
+            <a:avLst/>
+          </a:prstGeom>
+        </p:spPr>
+      </p:pic>
+      <p:sp>
+        <p:nvSpPr>
+          <p:cNvPr id="4" name="Rectangle: Rounded Corners 3"/>
+          <p:cNvSpPr/>
+          <p:nvPr/>
+        </p:nvSpPr>
+        <p:spPr>
+          <a:xfrm>
+            <a:off x="2164702" y="1903445"/>
+            <a:ext cx="886408" cy="419877"/>
+          </a:xfrm>
+          <a:prstGeom prst="roundRect">
+            <a:avLst/>
+          </a:prstGeom>
+          <a:noFill/>
+        </p:spPr>
+        <p:style>
+          <a:lnRef idx="2">
+            <a:schemeClr val="accent1">
+              <a:shade val="50000"/>
+            </a:schemeClr>
+          </a:lnRef>
+          <a:fillRef idx="1">
+            <a:schemeClr val="accent1"/>
+          </a:fillRef>
+          <a:effectRef idx="0">
+            <a:schemeClr val="accent1"/>
+          </a:effectRef>
+          <a:fontRef idx="minor">
+            <a:schemeClr val="lt1"/>
+          </a:fontRef>
+        </p:style>
+        <p:txBody>
+          <a:bodyPr rtlCol="0" anchor="ctr"/>
+          <a:lstStyle/>
+          <a:p>
+            <a:pPr algn="ctr"/>
+            <a:endParaRPr lang="en-US" dirty="0"/>
+          </a:p>
+        </p:txBody>
+      </p:sp>
+      <p:sp>
+        <p:nvSpPr>
+          <p:cNvPr id="6" name="Rectangle: Rounded Corners 5"/>
+          <p:cNvSpPr/>
+          <p:nvPr/>
+        </p:nvSpPr>
+        <p:spPr>
+          <a:xfrm>
+            <a:off x="8214049" y="4565780"/>
+            <a:ext cx="886408" cy="419877"/>
+          </a:xfrm>
+          <a:prstGeom prst="roundRect">
+            <a:avLst/>
+          </a:prstGeom>
+          <a:noFill/>
+        </p:spPr>
+        <p:style>
+          <a:lnRef idx="2">
+            <a:schemeClr val="accent1">
+              <a:shade val="50000"/>
+            </a:schemeClr>
+          </a:lnRef>
+          <a:fillRef idx="1">
+            <a:schemeClr val="accent1"/>
+          </a:fillRef>
+          <a:effectRef idx="0">
+            <a:schemeClr val="accent1"/>
+          </a:effectRef>
+          <a:fontRef idx="minor">
+            <a:schemeClr val="lt1"/>
+          </a:fontRef>
+        </p:style>
+        <p:txBody>
+          <a:bodyPr rtlCol="0" anchor="ctr"/>
+          <a:lstStyle/>
+          <a:p>
+            <a:pPr algn="ctr"/>
+            <a:endParaRPr lang="en-US" dirty="0"/>
+          </a:p>
+        </p:txBody>
+      </p:sp>
+      <p:sp>
+        <p:nvSpPr>
+          <p:cNvPr id="7" name="Rectangle: Rounded Corners 6"/>
+          <p:cNvSpPr/>
+          <p:nvPr/>
+        </p:nvSpPr>
+        <p:spPr>
+          <a:xfrm>
+            <a:off x="8214048" y="5840963"/>
+            <a:ext cx="2301551" cy="234752"/>
+          </a:xfrm>
+          <a:prstGeom prst="roundRect">
+            <a:avLst/>
+          </a:prstGeom>
+          <a:noFill/>
+        </p:spPr>
+        <p:style>
+          <a:lnRef idx="2">
+            <a:schemeClr val="accent1">
+              <a:shade val="50000"/>
+            </a:schemeClr>
+          </a:lnRef>
+          <a:fillRef idx="1">
+            <a:schemeClr val="accent1"/>
+          </a:fillRef>
+          <a:effectRef idx="0">
+            <a:schemeClr val="accent1"/>
+          </a:effectRef>
+          <a:fontRef idx="minor">
+            <a:schemeClr val="lt1"/>
+          </a:fontRef>
+        </p:style>
+        <p:txBody>
+          <a:bodyPr rtlCol="0" anchor="ctr"/>
+          <a:lstStyle/>
+          <a:p>
+            <a:pPr algn="ctr"/>
+            <a:endParaRPr lang="en-US" dirty="0"/>
+          </a:p>
+        </p:txBody>
+      </p:sp>
+      <p:sp>
+        <p:nvSpPr>
+          <p:cNvPr id="8" name="Rectangle: Rounded Corners 7"/>
+          <p:cNvSpPr/>
+          <p:nvPr/>
+        </p:nvSpPr>
+        <p:spPr>
+          <a:xfrm>
+            <a:off x="2164702" y="2746310"/>
+            <a:ext cx="3657600" cy="295470"/>
+          </a:xfrm>
+          <a:prstGeom prst="roundRect">
+            <a:avLst/>
+          </a:prstGeom>
+          <a:noFill/>
+        </p:spPr>
+        <p:style>
+          <a:lnRef idx="2">
+            <a:schemeClr val="accent1">
+              <a:shade val="50000"/>
+            </a:schemeClr>
+          </a:lnRef>
+          <a:fillRef idx="1">
+            <a:schemeClr val="accent1"/>
+          </a:fillRef>
+          <a:effectRef idx="0">
+            <a:schemeClr val="accent1"/>
+          </a:effectRef>
+          <a:fontRef idx="minor">
+            <a:schemeClr val="lt1"/>
+          </a:fontRef>
+        </p:style>
+        <p:txBody>
+          <a:bodyPr rtlCol="0" anchor="ctr"/>
+          <a:lstStyle/>
+          <a:p>
+            <a:pPr algn="ctr"/>
+            <a:endParaRPr lang="en-US" dirty="0"/>
+          </a:p>
+        </p:txBody>
+      </p:sp>
+      <p:sp>
+        <p:nvSpPr>
+          <p:cNvPr id="9" name="TextBox 8"/>
+          <p:cNvSpPr txBox="1"/>
+          <p:nvPr/>
+        </p:nvSpPr>
+        <p:spPr>
+          <a:xfrm>
+            <a:off x="2671653" y="4278676"/>
+            <a:ext cx="779381" cy="369332"/>
+          </a:xfrm>
+          <a:prstGeom prst="rect">
+            <a:avLst/>
+          </a:prstGeom>
+          <a:noFill/>
+        </p:spPr>
+        <p:txBody>
+          <a:bodyPr wrap="none" rtlCol="0">
+            <a:spAutoFit/>
+          </a:bodyPr>
+          <a:lstStyle/>
+          <a:p>
+            <a:r>
+              <a:rPr lang="en-US" dirty="0" err="1"/>
+              <a:t>uBoot</a:t>
+            </a:r>
+            <a:endParaRPr lang="en-US" dirty="0"/>
+          </a:p>
+        </p:txBody>
+      </p:sp>
+      <p:sp>
+        <p:nvSpPr>
+          <p:cNvPr id="10" name="TextBox 9"/>
+          <p:cNvSpPr txBox="1"/>
+          <p:nvPr/>
+        </p:nvSpPr>
+        <p:spPr>
+          <a:xfrm>
+            <a:off x="9021620" y="3266034"/>
+            <a:ext cx="686406" cy="369332"/>
+          </a:xfrm>
+          <a:prstGeom prst="rect">
+            <a:avLst/>
+          </a:prstGeom>
+          <a:noFill/>
+        </p:spPr>
+        <p:txBody>
+          <a:bodyPr wrap="none" rtlCol="0">
+            <a:spAutoFit/>
+          </a:bodyPr>
+          <a:lstStyle/>
+          <a:p>
+            <a:r>
+              <a:rPr lang="en-US" dirty="0"/>
+              <a:t>linux</a:t>
             </a:r>
           </a:p>
         </p:txBody>
@@ -7440,7 +7526,7 @@
     </p:spTree>
     <p:extLst>
       <p:ext uri="{BB962C8B-B14F-4D97-AF65-F5344CB8AC3E}">
-        <p14:creationId xmlns:p14="http://schemas.microsoft.com/office/powerpoint/2010/main" val="445207351"/>
+        <p14:creationId xmlns:p14="http://schemas.microsoft.com/office/powerpoint/2010/main" val="4230121359"/>
       </p:ext>
     </p:extLst>
   </p:cSld>
@@ -7475,8 +7561,8 @@
         </p:nvSpPr>
         <p:spPr>
           <a:xfrm>
-            <a:off x="265286" y="316496"/>
-            <a:ext cx="9010599" cy="369332"/>
+            <a:off x="4238319" y="2725588"/>
+            <a:ext cx="5072736" cy="1015663"/>
           </a:xfrm>
           <a:prstGeom prst="rect">
             <a:avLst/>
@@ -7489,86 +7575,16 @@
           <a:lstStyle/>
           <a:p>
             <a:r>
-              <a:rPr lang="en-US" b="1" dirty="0"/>
-              <a:t>GDB Commands</a:t>
-            </a:r>
-          </a:p>
-        </p:txBody>
-      </p:sp>
-      <p:sp>
-        <p:nvSpPr>
-          <p:cNvPr id="2" name="TextBox 1"/>
-          <p:cNvSpPr txBox="1"/>
-          <p:nvPr/>
-        </p:nvSpPr>
-        <p:spPr>
-          <a:xfrm>
-            <a:off x="975946" y="1433146"/>
-            <a:ext cx="2919139" cy="1477328"/>
-          </a:xfrm>
-          <a:prstGeom prst="rect">
-            <a:avLst/>
-          </a:prstGeom>
-          <a:noFill/>
-        </p:spPr>
-        <p:txBody>
-          <a:bodyPr wrap="square" rtlCol="0">
-            <a:spAutoFit/>
-          </a:bodyPr>
-          <a:lstStyle/>
-          <a:p>
-            <a:r>
-              <a:rPr lang="en-US" dirty="0"/>
-              <a:t>break </a:t>
-            </a:r>
-            <a:r>
-              <a:rPr lang="en-US" dirty="0" err="1"/>
-              <a:t>relocate_code</a:t>
-            </a:r>
-            <a:endParaRPr lang="en-US" dirty="0"/>
-          </a:p>
-          <a:p>
-            <a:r>
-              <a:rPr lang="en-US" dirty="0" err="1"/>
-              <a:t>cont</a:t>
-            </a:r>
-            <a:endParaRPr lang="en-US" dirty="0"/>
-          </a:p>
-          <a:p>
-            <a:r>
-              <a:rPr lang="en-US" dirty="0"/>
-              <a:t>break </a:t>
-            </a:r>
-            <a:r>
-              <a:rPr lang="en-US" dirty="0" err="1"/>
-              <a:t>relocate_done</a:t>
-            </a:r>
-            <a:endParaRPr lang="en-US" dirty="0"/>
-          </a:p>
-          <a:p>
-            <a:r>
-              <a:rPr lang="en-US" dirty="0" err="1"/>
-              <a:t>cont</a:t>
-            </a:r>
-            <a:endParaRPr lang="en-US" dirty="0"/>
-          </a:p>
-          <a:p>
-            <a:r>
-              <a:rPr lang="en-US" dirty="0"/>
-              <a:t>break </a:t>
-            </a:r>
-            <a:r>
-              <a:rPr lang="en-US" dirty="0" err="1"/>
-              <a:t>main_loop</a:t>
-            </a:r>
-            <a:endParaRPr lang="en-US" dirty="0"/>
+              <a:rPr lang="en-US" sz="6000" b="1" dirty="0"/>
+              <a:t>Q n A</a:t>
+            </a:r>
           </a:p>
         </p:txBody>
       </p:sp>
     </p:spTree>
     <p:extLst>
       <p:ext uri="{BB962C8B-B14F-4D97-AF65-F5344CB8AC3E}">
-        <p14:creationId xmlns:p14="http://schemas.microsoft.com/office/powerpoint/2010/main" val="3365617877"/>
+        <p14:creationId xmlns:p14="http://schemas.microsoft.com/office/powerpoint/2010/main" val="2147064688"/>
       </p:ext>
     </p:extLst>
   </p:cSld>
@@ -7844,6 +7860,192 @@
         </p:nvSpPr>
         <p:spPr>
           <a:xfrm>
+            <a:off x="4238319" y="2725588"/>
+            <a:ext cx="5072736" cy="1015663"/>
+          </a:xfrm>
+          <a:prstGeom prst="rect">
+            <a:avLst/>
+          </a:prstGeom>
+        </p:spPr>
+        <p:txBody>
+          <a:bodyPr wrap="square">
+            <a:spAutoFit/>
+          </a:bodyPr>
+          <a:lstStyle/>
+          <a:p>
+            <a:r>
+              <a:rPr lang="en-US" sz="6000" b="1" dirty="0"/>
+              <a:t>Backup Slides</a:t>
+            </a:r>
+          </a:p>
+        </p:txBody>
+      </p:sp>
+    </p:spTree>
+    <p:extLst>
+      <p:ext uri="{BB962C8B-B14F-4D97-AF65-F5344CB8AC3E}">
+        <p14:creationId xmlns:p14="http://schemas.microsoft.com/office/powerpoint/2010/main" val="445207351"/>
+      </p:ext>
+    </p:extLst>
+  </p:cSld>
+  <p:clrMapOvr>
+    <a:masterClrMapping/>
+  </p:clrMapOvr>
+</p:sld>
+</file>
+
+<file path=ppt/slides/slide21.xml><?xml version="1.0" encoding="utf-8"?>
+<p:sld xmlns:a="http://schemas.openxmlformats.org/drawingml/2006/main" xmlns:r="http://schemas.openxmlformats.org/officeDocument/2006/relationships" xmlns:p="http://schemas.openxmlformats.org/presentationml/2006/main">
+  <p:cSld>
+    <p:spTree>
+      <p:nvGrpSpPr>
+        <p:cNvPr id="1" name=""/>
+        <p:cNvGrpSpPr/>
+        <p:nvPr/>
+      </p:nvGrpSpPr>
+      <p:grpSpPr>
+        <a:xfrm>
+          <a:off x="0" y="0"/>
+          <a:ext cx="0" cy="0"/>
+          <a:chOff x="0" y="0"/>
+          <a:chExt cx="0" cy="0"/>
+        </a:xfrm>
+      </p:grpSpPr>
+      <p:sp>
+        <p:nvSpPr>
+          <p:cNvPr id="5" name="Rectangle 4"/>
+          <p:cNvSpPr/>
+          <p:nvPr/>
+        </p:nvSpPr>
+        <p:spPr>
+          <a:xfrm>
+            <a:off x="265286" y="316496"/>
+            <a:ext cx="9010599" cy="369332"/>
+          </a:xfrm>
+          <a:prstGeom prst="rect">
+            <a:avLst/>
+          </a:prstGeom>
+        </p:spPr>
+        <p:txBody>
+          <a:bodyPr wrap="square">
+            <a:spAutoFit/>
+          </a:bodyPr>
+          <a:lstStyle/>
+          <a:p>
+            <a:r>
+              <a:rPr lang="en-US" b="1" dirty="0"/>
+              <a:t>GDB Commands</a:t>
+            </a:r>
+          </a:p>
+        </p:txBody>
+      </p:sp>
+      <p:sp>
+        <p:nvSpPr>
+          <p:cNvPr id="2" name="TextBox 1"/>
+          <p:cNvSpPr txBox="1"/>
+          <p:nvPr/>
+        </p:nvSpPr>
+        <p:spPr>
+          <a:xfrm>
+            <a:off x="975946" y="1433146"/>
+            <a:ext cx="2919139" cy="1477328"/>
+          </a:xfrm>
+          <a:prstGeom prst="rect">
+            <a:avLst/>
+          </a:prstGeom>
+          <a:noFill/>
+        </p:spPr>
+        <p:txBody>
+          <a:bodyPr wrap="square" rtlCol="0">
+            <a:spAutoFit/>
+          </a:bodyPr>
+          <a:lstStyle/>
+          <a:p>
+            <a:r>
+              <a:rPr lang="en-US" dirty="0"/>
+              <a:t>break </a:t>
+            </a:r>
+            <a:r>
+              <a:rPr lang="en-US" dirty="0" err="1"/>
+              <a:t>relocate_code</a:t>
+            </a:r>
+            <a:endParaRPr lang="en-US" dirty="0"/>
+          </a:p>
+          <a:p>
+            <a:r>
+              <a:rPr lang="en-US" dirty="0" err="1"/>
+              <a:t>cont</a:t>
+            </a:r>
+            <a:endParaRPr lang="en-US" dirty="0"/>
+          </a:p>
+          <a:p>
+            <a:r>
+              <a:rPr lang="en-US" dirty="0"/>
+              <a:t>break </a:t>
+            </a:r>
+            <a:r>
+              <a:rPr lang="en-US" dirty="0" err="1"/>
+              <a:t>relocate_done</a:t>
+            </a:r>
+            <a:endParaRPr lang="en-US" dirty="0"/>
+          </a:p>
+          <a:p>
+            <a:r>
+              <a:rPr lang="en-US" dirty="0" err="1"/>
+              <a:t>cont</a:t>
+            </a:r>
+            <a:endParaRPr lang="en-US" dirty="0"/>
+          </a:p>
+          <a:p>
+            <a:r>
+              <a:rPr lang="en-US" dirty="0"/>
+              <a:t>break </a:t>
+            </a:r>
+            <a:r>
+              <a:rPr lang="en-US" dirty="0" err="1"/>
+              <a:t>main_loop</a:t>
+            </a:r>
+            <a:endParaRPr lang="en-US" dirty="0"/>
+          </a:p>
+        </p:txBody>
+      </p:sp>
+    </p:spTree>
+    <p:extLst>
+      <p:ext uri="{BB962C8B-B14F-4D97-AF65-F5344CB8AC3E}">
+        <p14:creationId xmlns:p14="http://schemas.microsoft.com/office/powerpoint/2010/main" val="3365617877"/>
+      </p:ext>
+    </p:extLst>
+  </p:cSld>
+  <p:clrMapOvr>
+    <a:masterClrMapping/>
+  </p:clrMapOvr>
+</p:sld>
+</file>
+
+<file path=ppt/slides/slide22.xml><?xml version="1.0" encoding="utf-8"?>
+<p:sld xmlns:a="http://schemas.openxmlformats.org/drawingml/2006/main" xmlns:r="http://schemas.openxmlformats.org/officeDocument/2006/relationships" xmlns:p="http://schemas.openxmlformats.org/presentationml/2006/main">
+  <p:cSld>
+    <p:spTree>
+      <p:nvGrpSpPr>
+        <p:cNvPr id="1" name=""/>
+        <p:cNvGrpSpPr/>
+        <p:nvPr/>
+      </p:nvGrpSpPr>
+      <p:grpSpPr>
+        <a:xfrm>
+          <a:off x="0" y="0"/>
+          <a:ext cx="0" cy="0"/>
+          <a:chOff x="0" y="0"/>
+          <a:chExt cx="0" cy="0"/>
+        </a:xfrm>
+      </p:grpSpPr>
+      <p:sp>
+        <p:nvSpPr>
+          <p:cNvPr id="5" name="Rectangle 4"/>
+          <p:cNvSpPr/>
+          <p:nvPr/>
+        </p:nvSpPr>
+        <p:spPr>
+          <a:xfrm>
             <a:off x="265286" y="316496"/>
             <a:ext cx="9010599" cy="369332"/>
           </a:xfrm>
@@ -7960,7 +8162,7 @@
 </p:sld>
 </file>
 
-<file path=ppt/slides/slide21.xml><?xml version="1.0" encoding="utf-8"?>
+<file path=ppt/slides/slide23.xml><?xml version="1.0" encoding="utf-8"?>
 <p:sld xmlns:a="http://schemas.openxmlformats.org/drawingml/2006/main" xmlns:r="http://schemas.openxmlformats.org/officeDocument/2006/relationships" xmlns:p="http://schemas.openxmlformats.org/presentationml/2006/main">
   <p:cSld>
     <p:spTree>
@@ -8754,65 +8956,15 @@
           <a:chExt cx="0" cy="0"/>
         </a:xfrm>
       </p:grpSpPr>
-      <p:sp>
-        <p:nvSpPr>
-          <p:cNvPr id="4" name="Rectangle 3"/>
-          <p:cNvSpPr/>
-          <p:nvPr/>
-        </p:nvSpPr>
-        <p:spPr>
-          <a:xfrm>
-            <a:off x="265286" y="316496"/>
-            <a:ext cx="9010599" cy="369332"/>
-          </a:xfrm>
-          <a:prstGeom prst="rect">
-            <a:avLst/>
-          </a:prstGeom>
-        </p:spPr>
-        <p:txBody>
-          <a:bodyPr wrap="square">
-            <a:spAutoFit/>
-          </a:bodyPr>
-          <a:lstStyle/>
-          <a:p>
-            <a:r>
-              <a:rPr lang="en-US" b="1" dirty="0"/>
-              <a:t>Adding Source Paths					p1</a:t>
-            </a:r>
-          </a:p>
-        </p:txBody>
-      </p:sp>
-      <p:sp>
-        <p:nvSpPr>
-          <p:cNvPr id="10" name="Rectangle 9"/>
-          <p:cNvSpPr/>
-          <p:nvPr/>
-        </p:nvSpPr>
-        <p:spPr>
-          <a:xfrm>
-            <a:off x="5524500" y="1053584"/>
-            <a:ext cx="6096000" cy="646331"/>
-          </a:xfrm>
-          <a:prstGeom prst="rect">
-            <a:avLst/>
-          </a:prstGeom>
-        </p:spPr>
-        <p:txBody>
-          <a:bodyPr>
-            <a:spAutoFit/>
-          </a:bodyPr>
-          <a:lstStyle/>
-          <a:p>
-            <a:endParaRPr lang="en-US" dirty="0"/>
-          </a:p>
-          <a:p>
-            <a:endParaRPr lang="en-US" dirty="0"/>
-          </a:p>
-        </p:txBody>
-      </p:sp>
       <p:pic>
         <p:nvPicPr>
-          <p:cNvPr id="3" name="Picture 2"/>
+          <p:cNvPr id="4" name="Picture 3">
+            <a:extLst>
+              <a:ext uri="{FF2B5EF4-FFF2-40B4-BE49-F238E27FC236}">
+                <a16:creationId xmlns:a16="http://schemas.microsoft.com/office/drawing/2014/main" id="{882A597E-38DE-4055-8C56-9E05D3C70198}"/>
+              </a:ext>
+            </a:extLst>
+          </p:cNvPr>
           <p:cNvPicPr>
             <a:picLocks noChangeAspect="1"/>
           </p:cNvPicPr>
@@ -8826,18 +8978,52 @@
         </p:blipFill>
         <p:spPr>
           <a:xfrm>
-            <a:off x="1369951" y="1191237"/>
-            <a:ext cx="8309097" cy="5406657"/>
+            <a:off x="1076325" y="1003102"/>
+            <a:ext cx="9629775" cy="5416748"/>
           </a:xfrm>
           <a:prstGeom prst="rect">
             <a:avLst/>
           </a:prstGeom>
         </p:spPr>
       </p:pic>
+      <p:sp>
+        <p:nvSpPr>
+          <p:cNvPr id="5" name="Rectangle 4">
+            <a:extLst>
+              <a:ext uri="{FF2B5EF4-FFF2-40B4-BE49-F238E27FC236}">
+                <a16:creationId xmlns:a16="http://schemas.microsoft.com/office/drawing/2014/main" id="{21CB1463-3388-40FB-BBD9-0F012DE5F9FF}"/>
+              </a:ext>
+            </a:extLst>
+          </p:cNvPr>
+          <p:cNvSpPr/>
+          <p:nvPr/>
+        </p:nvSpPr>
+        <p:spPr>
+          <a:xfrm>
+            <a:off x="265286" y="316496"/>
+            <a:ext cx="9010599" cy="369332"/>
+          </a:xfrm>
+          <a:prstGeom prst="rect">
+            <a:avLst/>
+          </a:prstGeom>
+        </p:spPr>
+        <p:txBody>
+          <a:bodyPr wrap="square">
+            <a:spAutoFit/>
+          </a:bodyPr>
+          <a:lstStyle/>
+          <a:p>
+            <a:r>
+              <a:rPr lang="en-US" b="1" dirty="0"/>
+              <a:t>Adding Source Paths					p1</a:t>
+            </a:r>
+          </a:p>
+        </p:txBody>
+      </p:sp>
     </p:spTree>
     <p:extLst>
       <p:ext uri="{BB962C8B-B14F-4D97-AF65-F5344CB8AC3E}">
-        <p14:creationId xmlns:p14="http://schemas.microsoft.com/office/powerpoint/2010/main" val="628995793"/>
+        <p14:creationId xmlns:p14="http://schemas.microsoft.com/office/powerpoint/2010/main" val="3479772408"/>
       </p:ext>
     </p:extLst>
   </p:cSld>
@@ -8866,7 +9052,13 @@
       </p:grpSpPr>
       <p:sp>
         <p:nvSpPr>
-          <p:cNvPr id="4" name="Rectangle 3"/>
+          <p:cNvPr id="5" name="Rectangle 4">
+            <a:extLst>
+              <a:ext uri="{FF2B5EF4-FFF2-40B4-BE49-F238E27FC236}">
+                <a16:creationId xmlns:a16="http://schemas.microsoft.com/office/drawing/2014/main" id="{21CB1463-3388-40FB-BBD9-0F012DE5F9FF}"/>
+              </a:ext>
+            </a:extLst>
+          </p:cNvPr>
           <p:cNvSpPr/>
           <p:nvPr/>
         </p:nvSpPr>
@@ -8892,38 +9084,40 @@
           </a:p>
         </p:txBody>
       </p:sp>
-      <p:sp>
-        <p:nvSpPr>
-          <p:cNvPr id="10" name="Rectangle 9"/>
-          <p:cNvSpPr/>
+      <p:pic>
+        <p:nvPicPr>
+          <p:cNvPr id="2" name="Picture 1">
+            <a:extLst>
+              <a:ext uri="{FF2B5EF4-FFF2-40B4-BE49-F238E27FC236}">
+                <a16:creationId xmlns:a16="http://schemas.microsoft.com/office/drawing/2014/main" id="{4BAFA6FA-5A68-4E87-B2A7-B74DB2AEC31F}"/>
+              </a:ext>
+            </a:extLst>
+          </p:cNvPr>
+          <p:cNvPicPr>
+            <a:picLocks noChangeAspect="1"/>
+          </p:cNvPicPr>
           <p:nvPr/>
-        </p:nvSpPr>
-        <p:spPr>
-          <a:xfrm>
-            <a:off x="5524500" y="1053584"/>
-            <a:ext cx="6096000" cy="646331"/>
+        </p:nvPicPr>
+        <p:blipFill>
+          <a:blip r:embed="rId2"/>
+          <a:stretch>
+            <a:fillRect/>
+          </a:stretch>
+        </p:blipFill>
+        <p:spPr>
+          <a:xfrm>
+            <a:off x="1491448" y="939367"/>
+            <a:ext cx="9685538" cy="5448115"/>
           </a:xfrm>
           <a:prstGeom prst="rect">
             <a:avLst/>
           </a:prstGeom>
         </p:spPr>
-        <p:txBody>
-          <a:bodyPr>
-            <a:spAutoFit/>
-          </a:bodyPr>
-          <a:lstStyle/>
-          <a:p>
-            <a:endParaRPr lang="en-US" dirty="0"/>
-          </a:p>
-          <a:p>
-            <a:endParaRPr lang="en-US" dirty="0"/>
-          </a:p>
-        </p:txBody>
-      </p:sp>
+      </p:pic>
     </p:spTree>
     <p:extLst>
       <p:ext uri="{BB962C8B-B14F-4D97-AF65-F5344CB8AC3E}">
-        <p14:creationId xmlns:p14="http://schemas.microsoft.com/office/powerpoint/2010/main" val="1216055662"/>
+        <p14:creationId xmlns:p14="http://schemas.microsoft.com/office/powerpoint/2010/main" val="3676774875"/>
       </p:ext>
     </p:extLst>
   </p:cSld>

</xml_diff>